<commit_message>
updated the readme file
</commit_message>
<xml_diff>
--- a/p1_navigation/Image/architecture.pptx
+++ b/p1_navigation/Image/architecture.pptx
@@ -104,6 +104,11 @@
       </a:defRPr>
     </a:lvl9pPr>
   </p:defaultTextStyle>
+  <p:extLst>
+    <p:ext uri="{EFAFB233-063F-42B5-8137-9DF3F51BA10A}">
+      <p15:sldGuideLst xmlns:p15="http://schemas.microsoft.com/office/powerpoint/2012/main"/>
+    </p:ext>
+  </p:extLst>
 </p:presentation>
 </file>
 
@@ -4402,8 +4407,8 @@
         </p:nvCxnSpPr>
         <p:spPr>
           <a:xfrm rot="5400000" flipH="1" flipV="1">
-            <a:off x="2350039" y="516866"/>
-            <a:ext cx="819601" cy="1827719"/>
+            <a:off x="2186211" y="353038"/>
+            <a:ext cx="1147257" cy="1827719"/>
           </a:xfrm>
           <a:prstGeom prst="bentConnector2">
             <a:avLst/>
@@ -4447,7 +4452,7 @@
         </p:nvGrpSpPr>
         <p:grpSpPr>
           <a:xfrm>
-            <a:off x="3560486" y="649461"/>
+            <a:off x="3560486" y="321801"/>
             <a:ext cx="2237680" cy="688338"/>
             <a:chOff x="5978376" y="873953"/>
             <a:chExt cx="2237680" cy="688338"/>
@@ -4590,12 +4595,12 @@
         </p:nvCxnSpPr>
         <p:spPr>
           <a:xfrm>
-            <a:off x="5678121" y="1030050"/>
-            <a:ext cx="4390539" cy="1689899"/>
+            <a:off x="5710690" y="701517"/>
+            <a:ext cx="4375676" cy="1939700"/>
           </a:xfrm>
           <a:prstGeom prst="bentConnector3">
             <a:avLst>
-              <a:gd name="adj1" fmla="val 99943"/>
+              <a:gd name="adj1" fmla="val 99979"/>
             </a:avLst>
           </a:prstGeom>
           <a:ln w="57150">
@@ -4737,7 +4742,7 @@
         </p:nvSpPr>
         <p:spPr>
           <a:xfrm>
-            <a:off x="6171240" y="702410"/>
+            <a:off x="6171240" y="374750"/>
             <a:ext cx="2596565" cy="646331"/>
           </a:xfrm>
           <a:prstGeom prst="rect">
@@ -5013,6 +5018,225 @@
               <a:rPr lang="en-US" b="1" dirty="0"/>
               <a:t>env</a:t>
             </a:r>
+          </a:p>
+        </p:txBody>
+      </p:sp>
+      <p:cxnSp>
+        <p:nvCxnSpPr>
+          <p:cNvPr id="34" name="Connector: Elbow 33">
+            <a:extLst>
+              <a:ext uri="{FF2B5EF4-FFF2-40B4-BE49-F238E27FC236}">
+                <a16:creationId xmlns:a16="http://schemas.microsoft.com/office/drawing/2014/main" id="{4B162F4C-0676-4360-B136-4925B65FAB5F}"/>
+              </a:ext>
+            </a:extLst>
+          </p:cNvPr>
+          <p:cNvCxnSpPr>
+            <a:cxnSpLocks/>
+            <a:endCxn id="28" idx="6"/>
+          </p:cNvCxnSpPr>
+          <p:nvPr/>
+        </p:nvCxnSpPr>
+        <p:spPr>
+          <a:xfrm rot="10800000">
+            <a:off x="1974582" y="1560021"/>
+            <a:ext cx="4352705" cy="259842"/>
+          </a:xfrm>
+          <a:prstGeom prst="bentConnector3">
+            <a:avLst>
+              <a:gd name="adj1" fmla="val 326"/>
+            </a:avLst>
+          </a:prstGeom>
+          <a:ln w="57150">
+            <a:solidFill>
+              <a:schemeClr val="accent2">
+                <a:lumMod val="40000"/>
+                <a:lumOff val="60000"/>
+              </a:schemeClr>
+            </a:solidFill>
+            <a:tailEnd type="triangle"/>
+          </a:ln>
+        </p:spPr>
+        <p:style>
+          <a:lnRef idx="1">
+            <a:schemeClr val="accent1"/>
+          </a:lnRef>
+          <a:fillRef idx="0">
+            <a:schemeClr val="accent1"/>
+          </a:fillRef>
+          <a:effectRef idx="0">
+            <a:schemeClr val="accent1"/>
+          </a:effectRef>
+          <a:fontRef idx="minor">
+            <a:schemeClr val="tx1"/>
+          </a:fontRef>
+        </p:style>
+      </p:cxnSp>
+      <p:sp>
+        <p:nvSpPr>
+          <p:cNvPr id="28" name="Oval 27">
+            <a:extLst>
+              <a:ext uri="{FF2B5EF4-FFF2-40B4-BE49-F238E27FC236}">
+                <a16:creationId xmlns:a16="http://schemas.microsoft.com/office/drawing/2014/main" id="{399774C7-8DCF-4E4B-8F8C-58CFA96971AA}"/>
+              </a:ext>
+            </a:extLst>
+          </p:cNvPr>
+          <p:cNvSpPr/>
+          <p:nvPr/>
+        </p:nvSpPr>
+        <p:spPr>
+          <a:xfrm>
+            <a:off x="1708557" y="1430725"/>
+            <a:ext cx="266024" cy="258591"/>
+          </a:xfrm>
+          <a:prstGeom prst="ellipse">
+            <a:avLst/>
+          </a:prstGeom>
+          <a:solidFill>
+            <a:schemeClr val="accent2">
+              <a:lumMod val="40000"/>
+              <a:lumOff val="60000"/>
+            </a:schemeClr>
+          </a:solidFill>
+        </p:spPr>
+        <p:style>
+          <a:lnRef idx="2">
+            <a:schemeClr val="accent2">
+              <a:shade val="50000"/>
+            </a:schemeClr>
+          </a:lnRef>
+          <a:fillRef idx="1">
+            <a:schemeClr val="accent2"/>
+          </a:fillRef>
+          <a:effectRef idx="0">
+            <a:schemeClr val="accent2"/>
+          </a:effectRef>
+          <a:fontRef idx="minor">
+            <a:schemeClr val="lt1"/>
+          </a:fontRef>
+        </p:style>
+        <p:txBody>
+          <a:bodyPr rtlCol="0" anchor="ctr"/>
+          <a:lstStyle/>
+          <a:p>
+            <a:pPr algn="ctr"/>
+            <a:endParaRPr lang="en-US"/>
+          </a:p>
+        </p:txBody>
+      </p:sp>
+      <p:sp>
+        <p:nvSpPr>
+          <p:cNvPr id="42" name="TextBox 41">
+            <a:extLst>
+              <a:ext uri="{FF2B5EF4-FFF2-40B4-BE49-F238E27FC236}">
+                <a16:creationId xmlns:a16="http://schemas.microsoft.com/office/drawing/2014/main" id="{17FE9458-6114-4288-9F6D-7797A5D176AB}"/>
+              </a:ext>
+            </a:extLst>
+          </p:cNvPr>
+          <p:cNvSpPr txBox="1"/>
+          <p:nvPr/>
+        </p:nvSpPr>
+        <p:spPr>
+          <a:xfrm>
+            <a:off x="1219009" y="879978"/>
+            <a:ext cx="2596565" cy="646331"/>
+          </a:xfrm>
+          <a:prstGeom prst="rect">
+            <a:avLst/>
+          </a:prstGeom>
+          <a:noFill/>
+        </p:spPr>
+        <p:txBody>
+          <a:bodyPr wrap="square" rtlCol="0">
+            <a:spAutoFit/>
+          </a:bodyPr>
+          <a:lstStyle/>
+          <a:p>
+            <a:pPr algn="ctr"/>
+            <a:r>
+              <a:rPr lang="en-US" altLang="zh-CN" dirty="0"/>
+              <a:t>Double</a:t>
+            </a:r>
+            <a:r>
+              <a:rPr lang="en-US" dirty="0"/>
+              <a:t> DQN</a:t>
+            </a:r>
+          </a:p>
+          <a:p>
+            <a:pPr algn="ctr"/>
+            <a:r>
+              <a:rPr lang="en-US" b="1" dirty="0" err="1">
+                <a:solidFill>
+                  <a:schemeClr val="accent2">
+                    <a:lumMod val="75000"/>
+                  </a:schemeClr>
+                </a:solidFill>
+              </a:rPr>
+              <a:t>Agent</a:t>
+            </a:r>
+            <a:r>
+              <a:rPr lang="en-US" dirty="0" err="1">
+                <a:solidFill>
+                  <a:schemeClr val="accent1"/>
+                </a:solidFill>
+              </a:rPr>
+              <a:t>.learn</a:t>
+            </a:r>
+            <a:endParaRPr lang="en-US" dirty="0">
+              <a:solidFill>
+                <a:schemeClr val="accent1"/>
+              </a:solidFill>
+            </a:endParaRPr>
+          </a:p>
+        </p:txBody>
+      </p:sp>
+      <p:sp>
+        <p:nvSpPr>
+          <p:cNvPr id="44" name="Minus Sign 43">
+            <a:extLst>
+              <a:ext uri="{FF2B5EF4-FFF2-40B4-BE49-F238E27FC236}">
+                <a16:creationId xmlns:a16="http://schemas.microsoft.com/office/drawing/2014/main" id="{385AA2D1-CEC9-42E2-807D-CB1E8B2E32F0}"/>
+              </a:ext>
+            </a:extLst>
+          </p:cNvPr>
+          <p:cNvSpPr/>
+          <p:nvPr/>
+        </p:nvSpPr>
+        <p:spPr>
+          <a:xfrm>
+            <a:off x="1737695" y="1502379"/>
+            <a:ext cx="207748" cy="115957"/>
+          </a:xfrm>
+          <a:prstGeom prst="mathMinus">
+            <a:avLst/>
+          </a:prstGeom>
+          <a:solidFill>
+            <a:schemeClr val="accent2">
+              <a:lumMod val="75000"/>
+            </a:schemeClr>
+          </a:solidFill>
+        </p:spPr>
+        <p:style>
+          <a:lnRef idx="2">
+            <a:schemeClr val="accent2">
+              <a:shade val="50000"/>
+            </a:schemeClr>
+          </a:lnRef>
+          <a:fillRef idx="1">
+            <a:schemeClr val="accent2"/>
+          </a:fillRef>
+          <a:effectRef idx="0">
+            <a:schemeClr val="accent2"/>
+          </a:effectRef>
+          <a:fontRef idx="minor">
+            <a:schemeClr val="lt1"/>
+          </a:fontRef>
+        </p:style>
+        <p:txBody>
+          <a:bodyPr rtlCol="0" anchor="ctr"/>
+          <a:lstStyle/>
+          <a:p>
+            <a:pPr algn="ctr"/>
+            <a:endParaRPr lang="en-US"/>
           </a:p>
         </p:txBody>
       </p:sp>

</xml_diff>